<commit_message>
powerpoint and games list style update
</commit_message>
<xml_diff>
--- a/documents/PresentationConcept.pptx
+++ b/documents/PresentationConcept.pptx
@@ -13,23 +13,23 @@
   <p:sldIdLst>
     <p:sldId id="256" r:id="rId2"/>
     <p:sldId id="257" r:id="rId3"/>
-    <p:sldId id="259" r:id="rId4"/>
-    <p:sldId id="260" r:id="rId5"/>
+    <p:sldId id="260" r:id="rId4"/>
+    <p:sldId id="259" r:id="rId5"/>
     <p:sldId id="258" r:id="rId6"/>
   </p:sldIdLst>
   <p:sldSz cx="9144000" cy="6858000" type="screen4x3"/>
   <p:notesSz cx="6858000" cy="9144000"/>
   <p:embeddedFontLst>
     <p:embeddedFont>
-      <p:font typeface="Calibri" pitchFamily="34" charset="0"/>
-      <p:regular r:id="rId9"/>
-      <p:bold r:id="rId10"/>
-      <p:italic r:id="rId11"/>
-      <p:boldItalic r:id="rId12"/>
+      <p:font typeface="HelveticaNeueLT Com 95 Blk" pitchFamily="34" charset="0"/>
+      <p:bold r:id="rId9"/>
+      <p:boldItalic r:id="rId10"/>
     </p:embeddedFont>
     <p:embeddedFont>
-      <p:font typeface="HelveticaNeueLT Com 95 Blk" pitchFamily="34" charset="0"/>
-      <p:bold r:id="rId13"/>
+      <p:font typeface="Calibri" pitchFamily="34" charset="0"/>
+      <p:regular r:id="rId11"/>
+      <p:bold r:id="rId12"/>
+      <p:italic r:id="rId13"/>
       <p:boldItalic r:id="rId14"/>
     </p:embeddedFont>
   </p:embeddedFontLst>
@@ -213,7 +213,7 @@
           <a:p>
             <a:fld id="{04128FA3-ED37-4E11-8DE7-F364F9B6A4BC}" type="datetimeFigureOut">
               <a:rPr lang="en-US" smtClean="0"/>
-              <a:t>9/10/2012</a:t>
+              <a:t>9/12/2012</a:t>
             </a:fld>
             <a:endParaRPr lang="en-US"/>
           </a:p>
@@ -378,7 +378,7 @@
           <a:p>
             <a:fld id="{3E901B62-3B7B-4E80-87CF-715E0AB68DE5}" type="datetimeFigureOut">
               <a:rPr lang="en-US" smtClean="0"/>
-              <a:t>9/10/2012</a:t>
+              <a:t>9/12/2012</a:t>
             </a:fld>
             <a:endParaRPr lang="en-US"/>
           </a:p>
@@ -945,7 +945,7 @@
           <a:p>
             <a:fld id="{9DCBC028-F1E9-4553-A84E-44234CAB717B}" type="datetimeFigureOut">
               <a:rPr lang="en-US" smtClean="0"/>
-              <a:t>9/10/2012</a:t>
+              <a:t>9/12/2012</a:t>
             </a:fld>
             <a:endParaRPr lang="en-US"/>
           </a:p>
@@ -1003,13 +1003,13 @@
   <p:clrMapOvr>
     <a:masterClrMapping/>
   </p:clrMapOvr>
-  <mc:AlternateContent xmlns:mc="http://schemas.openxmlformats.org/markup-compatibility/2006">
-    <mc:Choice xmlns:p14="http://schemas.microsoft.com/office/powerpoint/2010/main" Requires="p14">
+  <mc:AlternateContent xmlns:mc="http://schemas.openxmlformats.org/markup-compatibility/2006" xmlns:p14="http://schemas.microsoft.com/office/powerpoint/2010/main">
+    <mc:Choice Requires="p14">
       <p:transition p14:dur="80">
         <p:fade/>
       </p:transition>
     </mc:Choice>
-    <mc:Fallback>
+    <mc:Fallback xmlns="">
       <p:transition>
         <p:fade/>
       </p:transition>
@@ -1134,7 +1134,7 @@
           <a:p>
             <a:fld id="{9DCBC028-F1E9-4553-A84E-44234CAB717B}" type="datetimeFigureOut">
               <a:rPr lang="en-US" smtClean="0"/>
-              <a:t>9/10/2012</a:t>
+              <a:t>9/12/2012</a:t>
             </a:fld>
             <a:endParaRPr lang="en-US"/>
           </a:p>
@@ -1192,13 +1192,13 @@
   <p:clrMapOvr>
     <a:masterClrMapping/>
   </p:clrMapOvr>
-  <mc:AlternateContent xmlns:mc="http://schemas.openxmlformats.org/markup-compatibility/2006">
-    <mc:Choice xmlns:p14="http://schemas.microsoft.com/office/powerpoint/2010/main" Requires="p14">
+  <mc:AlternateContent xmlns:mc="http://schemas.openxmlformats.org/markup-compatibility/2006" xmlns:p14="http://schemas.microsoft.com/office/powerpoint/2010/main">
+    <mc:Choice Requires="p14">
       <p:transition p14:dur="80">
         <p:fade/>
       </p:transition>
     </mc:Choice>
-    <mc:Fallback>
+    <mc:Fallback xmlns="">
       <p:transition>
         <p:fade/>
       </p:transition>
@@ -1333,7 +1333,7 @@
           <a:p>
             <a:fld id="{9DCBC028-F1E9-4553-A84E-44234CAB717B}" type="datetimeFigureOut">
               <a:rPr lang="en-US" smtClean="0"/>
-              <a:t>9/10/2012</a:t>
+              <a:t>9/12/2012</a:t>
             </a:fld>
             <a:endParaRPr lang="en-US"/>
           </a:p>
@@ -1391,13 +1391,13 @@
   <p:clrMapOvr>
     <a:masterClrMapping/>
   </p:clrMapOvr>
-  <mc:AlternateContent xmlns:mc="http://schemas.openxmlformats.org/markup-compatibility/2006">
-    <mc:Choice xmlns:p14="http://schemas.microsoft.com/office/powerpoint/2010/main" Requires="p14">
+  <mc:AlternateContent xmlns:mc="http://schemas.openxmlformats.org/markup-compatibility/2006" xmlns:p14="http://schemas.microsoft.com/office/powerpoint/2010/main">
+    <mc:Choice Requires="p14">
       <p:transition p14:dur="80">
         <p:fade/>
       </p:transition>
     </mc:Choice>
-    <mc:Fallback>
+    <mc:Fallback xmlns="">
       <p:transition>
         <p:fade/>
       </p:transition>
@@ -1587,7 +1587,7 @@
           <a:p>
             <a:fld id="{9DCBC028-F1E9-4553-A84E-44234CAB717B}" type="datetimeFigureOut">
               <a:rPr lang="en-US" smtClean="0"/>
-              <a:t>9/10/2012</a:t>
+              <a:t>9/12/2012</a:t>
             </a:fld>
             <a:endParaRPr lang="en-US"/>
           </a:p>
@@ -1645,13 +1645,13 @@
   <p:clrMapOvr>
     <a:masterClrMapping/>
   </p:clrMapOvr>
-  <mc:AlternateContent xmlns:mc="http://schemas.openxmlformats.org/markup-compatibility/2006">
-    <mc:Choice xmlns:p14="http://schemas.microsoft.com/office/powerpoint/2010/main" Requires="p14">
+  <mc:AlternateContent xmlns:mc="http://schemas.openxmlformats.org/markup-compatibility/2006" xmlns:p14="http://schemas.microsoft.com/office/powerpoint/2010/main">
+    <mc:Choice Requires="p14">
       <p:transition p14:dur="80">
         <p:fade/>
       </p:transition>
     </mc:Choice>
-    <mc:Fallback>
+    <mc:Fallback xmlns="">
       <p:transition>
         <p:fade/>
       </p:transition>
@@ -1852,7 +1852,7 @@
           <a:p>
             <a:fld id="{9DCBC028-F1E9-4553-A84E-44234CAB717B}" type="datetimeFigureOut">
               <a:rPr lang="en-US" smtClean="0"/>
-              <a:t>9/10/2012</a:t>
+              <a:t>9/12/2012</a:t>
             </a:fld>
             <a:endParaRPr lang="en-US"/>
           </a:p>
@@ -1910,13 +1910,13 @@
   <p:clrMapOvr>
     <a:masterClrMapping/>
   </p:clrMapOvr>
-  <mc:AlternateContent xmlns:mc="http://schemas.openxmlformats.org/markup-compatibility/2006">
-    <mc:Choice xmlns:p14="http://schemas.microsoft.com/office/powerpoint/2010/main" Requires="p14">
+  <mc:AlternateContent xmlns:mc="http://schemas.openxmlformats.org/markup-compatibility/2006" xmlns:p14="http://schemas.microsoft.com/office/powerpoint/2010/main">
+    <mc:Choice Requires="p14">
       <p:transition p14:dur="80">
         <p:fade/>
       </p:transition>
     </mc:Choice>
-    <mc:Fallback>
+    <mc:Fallback xmlns="">
       <p:transition>
         <p:fade/>
       </p:transition>
@@ -2159,7 +2159,7 @@
           <a:p>
             <a:fld id="{9DCBC028-F1E9-4553-A84E-44234CAB717B}" type="datetimeFigureOut">
               <a:rPr lang="en-US" smtClean="0"/>
-              <a:t>9/10/2012</a:t>
+              <a:t>9/12/2012</a:t>
             </a:fld>
             <a:endParaRPr lang="en-US"/>
           </a:p>
@@ -2217,13 +2217,13 @@
   <p:clrMapOvr>
     <a:masterClrMapping/>
   </p:clrMapOvr>
-  <mc:AlternateContent xmlns:mc="http://schemas.openxmlformats.org/markup-compatibility/2006">
-    <mc:Choice xmlns:p14="http://schemas.microsoft.com/office/powerpoint/2010/main" Requires="p14">
+  <mc:AlternateContent xmlns:mc="http://schemas.openxmlformats.org/markup-compatibility/2006" xmlns:p14="http://schemas.microsoft.com/office/powerpoint/2010/main">
+    <mc:Choice Requires="p14">
       <p:transition p14:dur="80">
         <p:fade/>
       </p:transition>
     </mc:Choice>
-    <mc:Fallback>
+    <mc:Fallback xmlns="">
       <p:transition>
         <p:fade/>
       </p:transition>
@@ -2600,7 +2600,7 @@
           <a:p>
             <a:fld id="{9DCBC028-F1E9-4553-A84E-44234CAB717B}" type="datetimeFigureOut">
               <a:rPr lang="en-US" smtClean="0"/>
-              <a:t>9/10/2012</a:t>
+              <a:t>9/12/2012</a:t>
             </a:fld>
             <a:endParaRPr lang="en-US"/>
           </a:p>
@@ -2658,13 +2658,13 @@
   <p:clrMapOvr>
     <a:masterClrMapping/>
   </p:clrMapOvr>
-  <mc:AlternateContent xmlns:mc="http://schemas.openxmlformats.org/markup-compatibility/2006">
-    <mc:Choice xmlns:p14="http://schemas.microsoft.com/office/powerpoint/2010/main" Requires="p14">
+  <mc:AlternateContent xmlns:mc="http://schemas.openxmlformats.org/markup-compatibility/2006" xmlns:p14="http://schemas.microsoft.com/office/powerpoint/2010/main">
+    <mc:Choice Requires="p14">
       <p:transition p14:dur="80">
         <p:fade/>
       </p:transition>
     </mc:Choice>
-    <mc:Fallback>
+    <mc:Fallback xmlns="">
       <p:transition>
         <p:fade/>
       </p:transition>
@@ -2727,7 +2727,7 @@
           </a:bodyPr>
           <a:lstStyle>
             <a:lvl1pPr>
-              <a:defRPr lang="en-US" sz="9600" b="0" strike="noStrike" kern="1200" cap="none" spc="-400" normalizeH="0" baseline="0" dirty="0">
+              <a:defRPr lang="en-US" sz="11200" b="0" strike="noStrike" kern="1200" cap="none" spc="-400" normalizeH="0" baseline="0" dirty="0">
                 <a:solidFill>
                   <a:schemeClr val="bg1"/>
                 </a:solidFill>
@@ -2763,13 +2763,13 @@
   <p:clrMapOvr>
     <a:masterClrMapping/>
   </p:clrMapOvr>
-  <mc:AlternateContent xmlns:mc="http://schemas.openxmlformats.org/markup-compatibility/2006">
-    <mc:Choice xmlns:p14="http://schemas.microsoft.com/office/powerpoint/2010/main" Requires="p14">
+  <mc:AlternateContent xmlns:mc="http://schemas.openxmlformats.org/markup-compatibility/2006" xmlns:p14="http://schemas.microsoft.com/office/powerpoint/2010/main">
+    <mc:Choice Requires="p14">
       <p:transition p14:dur="80">
         <p:fade/>
       </p:transition>
     </mc:Choice>
-    <mc:Fallback>
+    <mc:Fallback xmlns="">
       <p:transition>
         <p:fade/>
       </p:transition>
@@ -2819,7 +2819,7 @@
           <a:p>
             <a:fld id="{9DCBC028-F1E9-4553-A84E-44234CAB717B}" type="datetimeFigureOut">
               <a:rPr lang="en-US" smtClean="0"/>
-              <a:t>9/10/2012</a:t>
+              <a:t>9/12/2012</a:t>
             </a:fld>
             <a:endParaRPr lang="en-US"/>
           </a:p>
@@ -2877,13 +2877,13 @@
   <p:clrMapOvr>
     <a:masterClrMapping/>
   </p:clrMapOvr>
-  <mc:AlternateContent xmlns:mc="http://schemas.openxmlformats.org/markup-compatibility/2006">
-    <mc:Choice xmlns:p14="http://schemas.microsoft.com/office/powerpoint/2010/main" Requires="p14">
+  <mc:AlternateContent xmlns:mc="http://schemas.openxmlformats.org/markup-compatibility/2006" xmlns:p14="http://schemas.microsoft.com/office/powerpoint/2010/main">
+    <mc:Choice Requires="p14">
       <p:transition p14:dur="80">
         <p:fade/>
       </p:transition>
     </mc:Choice>
-    <mc:Fallback>
+    <mc:Fallback xmlns="">
       <p:transition>
         <p:fade/>
       </p:transition>
@@ -3108,7 +3108,7 @@
           <a:p>
             <a:fld id="{9DCBC028-F1E9-4553-A84E-44234CAB717B}" type="datetimeFigureOut">
               <a:rPr lang="en-US" smtClean="0"/>
-              <a:t>9/10/2012</a:t>
+              <a:t>9/12/2012</a:t>
             </a:fld>
             <a:endParaRPr lang="en-US"/>
           </a:p>
@@ -3166,13 +3166,13 @@
   <p:clrMapOvr>
     <a:masterClrMapping/>
   </p:clrMapOvr>
-  <mc:AlternateContent xmlns:mc="http://schemas.openxmlformats.org/markup-compatibility/2006">
-    <mc:Choice xmlns:p14="http://schemas.microsoft.com/office/powerpoint/2010/main" Requires="p14">
+  <mc:AlternateContent xmlns:mc="http://schemas.openxmlformats.org/markup-compatibility/2006" xmlns:p14="http://schemas.microsoft.com/office/powerpoint/2010/main">
+    <mc:Choice Requires="p14">
       <p:transition p14:dur="80">
         <p:fade/>
       </p:transition>
     </mc:Choice>
-    <mc:Fallback>
+    <mc:Fallback xmlns="">
       <p:transition>
         <p:fade/>
       </p:transition>
@@ -3264,7 +3264,7 @@
         <p:nvSpPr>
           <p:cNvPr id="3" name="Picture Placeholder 2"/>
           <p:cNvSpPr>
-            <a:spLocks noGrp="1"/>
+            <a:spLocks noGrp="1" noChangeAspect="1"/>
           </p:cNvSpPr>
           <p:nvPr>
             <p:ph type="pic" idx="1"/>
@@ -3338,13 +3338,13 @@
   <p:clrMapOvr>
     <a:masterClrMapping/>
   </p:clrMapOvr>
-  <mc:AlternateContent xmlns:mc="http://schemas.openxmlformats.org/markup-compatibility/2006">
-    <mc:Choice xmlns:p14="http://schemas.microsoft.com/office/powerpoint/2010/main" Requires="p14">
+  <mc:AlternateContent xmlns:mc="http://schemas.openxmlformats.org/markup-compatibility/2006" xmlns:p14="http://schemas.microsoft.com/office/powerpoint/2010/main">
+    <mc:Choice Requires="p14">
       <p:transition p14:dur="80">
         <p:fade/>
       </p:transition>
     </mc:Choice>
-    <mc:Fallback>
+    <mc:Fallback xmlns="">
       <p:transition>
         <p:fade/>
       </p:transition>
@@ -3521,7 +3521,7 @@
             <a:fld id="{9DCBC028-F1E9-4553-A84E-44234CAB717B}" type="datetimeFigureOut">
               <a:rPr lang="en-US" smtClean="0"/>
               <a:pPr/>
-              <a:t>9/10/2012</a:t>
+              <a:t>9/12/2012</a:t>
             </a:fld>
             <a:endParaRPr lang="en-US"/>
           </a:p>
@@ -3713,13 +3713,13 @@
     <p:sldLayoutId id="2147483658" r:id="rId10"/>
     <p:sldLayoutId id="2147483659" r:id="rId11"/>
   </p:sldLayoutIdLst>
-  <mc:AlternateContent xmlns:mc="http://schemas.openxmlformats.org/markup-compatibility/2006">
-    <mc:Choice xmlns:p14="http://schemas.microsoft.com/office/powerpoint/2010/main" Requires="p14">
+  <mc:AlternateContent xmlns:mc="http://schemas.openxmlformats.org/markup-compatibility/2006" xmlns:p14="http://schemas.microsoft.com/office/powerpoint/2010/main">
+    <mc:Choice Requires="p14">
       <p:transition p14:dur="80">
         <p:fade/>
       </p:transition>
     </mc:Choice>
-    <mc:Fallback>
+    <mc:Fallback xmlns="">
       <p:transition>
         <p:fade/>
       </p:transition>
@@ -4573,13 +4573,13 @@
   <p:clrMapOvr>
     <a:masterClrMapping/>
   </p:clrMapOvr>
-  <mc:AlternateContent xmlns:mc="http://schemas.openxmlformats.org/markup-compatibility/2006">
-    <mc:Choice xmlns:p14="http://schemas.microsoft.com/office/powerpoint/2010/main" Requires="p14">
+  <mc:AlternateContent xmlns:mc="http://schemas.openxmlformats.org/markup-compatibility/2006" xmlns:p14="http://schemas.microsoft.com/office/powerpoint/2010/main">
+    <mc:Choice Requires="p14">
       <p:transition p14:dur="80">
         <p:fade/>
       </p:transition>
     </mc:Choice>
-    <mc:Fallback>
+    <mc:Fallback xmlns="">
       <p:transition>
         <p:fade/>
       </p:transition>
@@ -4713,13 +4713,13 @@
   <p:clrMapOvr>
     <a:masterClrMapping/>
   </p:clrMapOvr>
-  <mc:AlternateContent xmlns:mc="http://schemas.openxmlformats.org/markup-compatibility/2006">
-    <mc:Choice xmlns:p14="http://schemas.microsoft.com/office/powerpoint/2010/main" Requires="p14">
+  <mc:AlternateContent xmlns:mc="http://schemas.openxmlformats.org/markup-compatibility/2006" xmlns:p14="http://schemas.microsoft.com/office/powerpoint/2010/main">
+    <mc:Choice Requires="p14">
       <p:transition p14:dur="80">
         <p:fade/>
       </p:transition>
     </mc:Choice>
-    <mc:Fallback>
+    <mc:Fallback xmlns="">
       <p:transition>
         <p:fade/>
       </p:transition>
@@ -4773,45 +4773,45 @@
       </p:sp>
       <p:sp>
         <p:nvSpPr>
-          <p:cNvPr id="3" name="Picture Placeholder 2"/>
-          <p:cNvSpPr>
-            <a:spLocks noGrp="1"/>
-          </p:cNvSpPr>
-          <p:nvPr>
-            <p:ph type="pic" idx="1"/>
+          <p:cNvPr id="3" name="Content Placeholder 2"/>
+          <p:cNvSpPr>
+            <a:spLocks noGrp="1"/>
+          </p:cNvSpPr>
+          <p:nvPr>
+            <p:ph idx="1"/>
           </p:nvPr>
         </p:nvSpPr>
         <p:spPr/>
+        <p:txBody>
+          <a:bodyPr/>
+          <a:lstStyle/>
+          <a:p>
+            <a:endParaRPr lang="en-US"/>
+          </a:p>
+        </p:txBody>
       </p:sp>
     </p:spTree>
     <p:extLst>
       <p:ext uri="{BB962C8B-B14F-4D97-AF65-F5344CB8AC3E}">
-        <p14:creationId xmlns:p14="http://schemas.microsoft.com/office/powerpoint/2010/main" val="2342813386"/>
+        <p14:creationId xmlns:p14="http://schemas.microsoft.com/office/powerpoint/2010/main" val="3827635785"/>
       </p:ext>
     </p:extLst>
   </p:cSld>
   <p:clrMapOvr>
     <a:masterClrMapping/>
   </p:clrMapOvr>
-  <mc:AlternateContent xmlns:mc="http://schemas.openxmlformats.org/markup-compatibility/2006">
-    <mc:Choice xmlns:p14="http://schemas.microsoft.com/office/powerpoint/2010/main" Requires="p14">
+  <mc:AlternateContent xmlns:mc="http://schemas.openxmlformats.org/markup-compatibility/2006" xmlns:p14="http://schemas.microsoft.com/office/powerpoint/2010/main">
+    <mc:Choice Requires="p14">
       <p:transition p14:dur="80">
         <p:fade/>
       </p:transition>
     </mc:Choice>
-    <mc:Fallback>
+    <mc:Fallback xmlns="">
       <p:transition>
         <p:fade/>
       </p:transition>
     </mc:Fallback>
   </mc:AlternateContent>
-  <p:timing>
-    <p:tnLst>
-      <p:par>
-        <p:cTn id="1" dur="indefinite" restart="never" nodeType="tmRoot"/>
-      </p:par>
-    </p:tnLst>
-  </p:timing>
 </p:sld>
 </file>
 
@@ -4847,39 +4847,68 @@
           <a:bodyPr/>
           <a:lstStyle/>
           <a:p>
-            <a:endParaRPr lang="en-US"/>
-          </a:p>
-        </p:txBody>
-      </p:sp>
-      <p:sp>
-        <p:nvSpPr>
-          <p:cNvPr id="3" name="Picture Placeholder 2"/>
-          <p:cNvSpPr>
-            <a:spLocks noGrp="1"/>
-          </p:cNvSpPr>
-          <p:nvPr>
-            <p:ph type="pic" idx="1"/>
-          </p:nvPr>
-        </p:nvSpPr>
-        <p:spPr/>
-      </p:sp>
+            <a:r>
+              <a:rPr lang="en-US" dirty="0" smtClean="0"/>
+              <a:t>intro screen</a:t>
+            </a:r>
+            <a:endParaRPr lang="en-US" dirty="0"/>
+          </a:p>
+        </p:txBody>
+      </p:sp>
+      <p:pic>
+        <p:nvPicPr>
+          <p:cNvPr id="8" name="Picture 7"/>
+          <p:cNvPicPr>
+            <a:picLocks noChangeAspect="1"/>
+          </p:cNvPicPr>
+          <p:nvPr/>
+        </p:nvPicPr>
+        <p:blipFill>
+          <a:blip r:embed="rId2" cstate="print">
+            <a:extLst>
+              <a:ext uri="{28A0092B-C50C-407E-A947-70E740481C1C}">
+                <a14:useLocalDpi xmlns:a14="http://schemas.microsoft.com/office/drawing/2010/main" val="0"/>
+              </a:ext>
+            </a:extLst>
+          </a:blip>
+          <a:stretch>
+            <a:fillRect/>
+          </a:stretch>
+        </p:blipFill>
+        <p:spPr>
+          <a:xfrm>
+            <a:off x="3102634" y="263904"/>
+            <a:ext cx="2927230" cy="5203964"/>
+          </a:xfrm>
+          <a:prstGeom prst="rect">
+            <a:avLst/>
+          </a:prstGeom>
+          <a:effectLst>
+            <a:glow rad="101600">
+              <a:srgbClr val="8A9AA1">
+                <a:alpha val="36000"/>
+              </a:srgbClr>
+            </a:glow>
+          </a:effectLst>
+        </p:spPr>
+      </p:pic>
     </p:spTree>
     <p:extLst>
       <p:ext uri="{BB962C8B-B14F-4D97-AF65-F5344CB8AC3E}">
-        <p14:creationId xmlns:p14="http://schemas.microsoft.com/office/powerpoint/2010/main" val="2632864066"/>
+        <p14:creationId xmlns:p14="http://schemas.microsoft.com/office/powerpoint/2010/main" val="1872965850"/>
       </p:ext>
     </p:extLst>
   </p:cSld>
   <p:clrMapOvr>
     <a:masterClrMapping/>
   </p:clrMapOvr>
-  <mc:AlternateContent xmlns:mc="http://schemas.openxmlformats.org/markup-compatibility/2006">
-    <mc:Choice xmlns:p14="http://schemas.microsoft.com/office/powerpoint/2010/main" Requires="p14">
+  <mc:AlternateContent xmlns:mc="http://schemas.openxmlformats.org/markup-compatibility/2006" xmlns:p14="http://schemas.microsoft.com/office/powerpoint/2010/main">
+    <mc:Choice Requires="p14">
       <p:transition p14:dur="80">
         <p:fade/>
       </p:transition>
     </mc:Choice>
-    <mc:Fallback>
+    <mc:Fallback xmlns="">
       <p:transition>
         <p:fade/>
       </p:transition>
@@ -4924,16 +4953,14 @@
         </p:nvSpPr>
         <p:spPr/>
         <p:txBody>
-          <a:bodyPr>
-            <a:normAutofit/>
-          </a:bodyPr>
+          <a:bodyPr/>
           <a:lstStyle/>
           <a:p>
             <a:r>
-              <a:rPr lang="en-US" sz="25600" dirty="0" smtClean="0"/>
-              <a:t>?</a:t>
-            </a:r>
-            <a:endParaRPr lang="en-US" sz="25600" dirty="0"/>
+              <a:rPr lang="en-US" dirty="0" smtClean="0"/>
+              <a:t>questions?</a:t>
+            </a:r>
+            <a:endParaRPr lang="en-US" dirty="0"/>
           </a:p>
         </p:txBody>
       </p:sp>
@@ -4947,13 +4974,13 @@
   <p:clrMapOvr>
     <a:masterClrMapping/>
   </p:clrMapOvr>
-  <mc:AlternateContent xmlns:mc="http://schemas.openxmlformats.org/markup-compatibility/2006">
-    <mc:Choice xmlns:p14="http://schemas.microsoft.com/office/powerpoint/2010/main" Requires="p14">
+  <mc:AlternateContent xmlns:mc="http://schemas.openxmlformats.org/markup-compatibility/2006" xmlns:p14="http://schemas.microsoft.com/office/powerpoint/2010/main">
+    <mc:Choice Requires="p14">
       <p:transition p14:dur="80">
         <p:fade/>
       </p:transition>
     </mc:Choice>
-    <mc:Fallback>
+    <mc:Fallback xmlns="">
       <p:transition>
         <p:fade/>
       </p:transition>

</xml_diff>